<commit_message>
[DOC][HEVC FEI] Fixed Figure#4 in HEVC FEI manual
Replaced picture with correct zigzag order

Issue: no
Test: no

Change-Id: I55d1135eb1d3b07ce6dd8e8779d8b912ff39d448
</commit_message>
<xml_diff>
--- a/documentation/pic_src/HEVC_FEI_16x16_MVP_skip_mode.pptx
+++ b/documentation/pic_src/HEVC_FEI_16x16_MVP_skip_mode.pptx
@@ -104,6 +104,11 @@
       </a:defRPr>
     </a:lvl9pPr>
   </p:defaultTextStyle>
+  <p:extLst>
+    <p:ext uri="{EFAFB233-063F-42B5-8137-9DF3F51BA10A}">
+      <p15:sldGuideLst xmlns:p15="http://schemas.microsoft.com/office/powerpoint/2012/main"/>
+    </p:ext>
+  </p:extLst>
 </p:presentation>
 </file>
 
@@ -238,7 +243,7 @@
           <a:p>
             <a:fld id="{43B18B5D-4187-4585-A246-F2A42183247A}" type="datetimeFigureOut">
               <a:rPr lang="en-US" smtClean="0"/>
-              <a:t>3/1/2018</a:t>
+              <a:t>4/18/2018</a:t>
             </a:fld>
             <a:endParaRPr lang="en-US"/>
           </a:p>
@@ -408,7 +413,7 @@
           <a:p>
             <a:fld id="{43B18B5D-4187-4585-A246-F2A42183247A}" type="datetimeFigureOut">
               <a:rPr lang="en-US" smtClean="0"/>
-              <a:t>3/1/2018</a:t>
+              <a:t>4/18/2018</a:t>
             </a:fld>
             <a:endParaRPr lang="en-US"/>
           </a:p>
@@ -588,7 +593,7 @@
           <a:p>
             <a:fld id="{43B18B5D-4187-4585-A246-F2A42183247A}" type="datetimeFigureOut">
               <a:rPr lang="en-US" smtClean="0"/>
-              <a:t>3/1/2018</a:t>
+              <a:t>4/18/2018</a:t>
             </a:fld>
             <a:endParaRPr lang="en-US"/>
           </a:p>
@@ -758,7 +763,7 @@
           <a:p>
             <a:fld id="{43B18B5D-4187-4585-A246-F2A42183247A}" type="datetimeFigureOut">
               <a:rPr lang="en-US" smtClean="0"/>
-              <a:t>3/1/2018</a:t>
+              <a:t>4/18/2018</a:t>
             </a:fld>
             <a:endParaRPr lang="en-US"/>
           </a:p>
@@ -1004,7 +1009,7 @@
           <a:p>
             <a:fld id="{43B18B5D-4187-4585-A246-F2A42183247A}" type="datetimeFigureOut">
               <a:rPr lang="en-US" smtClean="0"/>
-              <a:t>3/1/2018</a:t>
+              <a:t>4/18/2018</a:t>
             </a:fld>
             <a:endParaRPr lang="en-US"/>
           </a:p>
@@ -1236,7 +1241,7 @@
           <a:p>
             <a:fld id="{43B18B5D-4187-4585-A246-F2A42183247A}" type="datetimeFigureOut">
               <a:rPr lang="en-US" smtClean="0"/>
-              <a:t>3/1/2018</a:t>
+              <a:t>4/18/2018</a:t>
             </a:fld>
             <a:endParaRPr lang="en-US"/>
           </a:p>
@@ -1603,7 +1608,7 @@
           <a:p>
             <a:fld id="{43B18B5D-4187-4585-A246-F2A42183247A}" type="datetimeFigureOut">
               <a:rPr lang="en-US" smtClean="0"/>
-              <a:t>3/1/2018</a:t>
+              <a:t>4/18/2018</a:t>
             </a:fld>
             <a:endParaRPr lang="en-US"/>
           </a:p>
@@ -1721,7 +1726,7 @@
           <a:p>
             <a:fld id="{43B18B5D-4187-4585-A246-F2A42183247A}" type="datetimeFigureOut">
               <a:rPr lang="en-US" smtClean="0"/>
-              <a:t>3/1/2018</a:t>
+              <a:t>4/18/2018</a:t>
             </a:fld>
             <a:endParaRPr lang="en-US"/>
           </a:p>
@@ -1816,7 +1821,7 @@
           <a:p>
             <a:fld id="{43B18B5D-4187-4585-A246-F2A42183247A}" type="datetimeFigureOut">
               <a:rPr lang="en-US" smtClean="0"/>
-              <a:t>3/1/2018</a:t>
+              <a:t>4/18/2018</a:t>
             </a:fld>
             <a:endParaRPr lang="en-US"/>
           </a:p>
@@ -2093,7 +2098,7 @@
           <a:p>
             <a:fld id="{43B18B5D-4187-4585-A246-F2A42183247A}" type="datetimeFigureOut">
               <a:rPr lang="en-US" smtClean="0"/>
-              <a:t>3/1/2018</a:t>
+              <a:t>4/18/2018</a:t>
             </a:fld>
             <a:endParaRPr lang="en-US"/>
           </a:p>
@@ -2346,7 +2351,7 @@
           <a:p>
             <a:fld id="{43B18B5D-4187-4585-A246-F2A42183247A}" type="datetimeFigureOut">
               <a:rPr lang="en-US" smtClean="0"/>
-              <a:t>3/1/2018</a:t>
+              <a:t>4/18/2018</a:t>
             </a:fld>
             <a:endParaRPr lang="en-US"/>
           </a:p>
@@ -2559,7 +2564,7 @@
           <a:p>
             <a:fld id="{43B18B5D-4187-4585-A246-F2A42183247A}" type="datetimeFigureOut">
               <a:rPr lang="en-US" smtClean="0"/>
-              <a:t>3/1/2018</a:t>
+              <a:t>4/18/2018</a:t>
             </a:fld>
             <a:endParaRPr lang="en-US"/>
           </a:p>
@@ -3250,13 +3255,13 @@
               <a:defRPr/>
             </a:pPr>
             <a:r>
-              <a:rPr lang="en-US" kern="0" dirty="0">
+              <a:rPr lang="en-US" kern="0" noProof="0" dirty="0">
                 <a:solidFill>
                   <a:prstClr val="black"/>
                 </a:solidFill>
                 <a:latin typeface="Intel Clear"/>
               </a:rPr>
-              <a:t>6</a:t>
+              <a:t>5</a:t>
             </a:r>
             <a:endParaRPr kumimoji="0" lang="en-US" sz="1800" b="0" i="0" u="none" strike="noStrike" kern="0" cap="none" spc="0" normalizeH="0" baseline="0" noProof="0" dirty="0">
               <a:ln>
@@ -3464,20 +3469,14 @@
               <a:defRPr/>
             </a:pPr>
             <a:r>
-              <a:rPr lang="en-US" kern="0" dirty="0" smtClean="0">
+              <a:rPr lang="en-US" kern="0" dirty="0">
                 <a:solidFill>
                   <a:prstClr val="black"/>
                 </a:solidFill>
                 <a:latin typeface="Intel Clear"/>
               </a:rPr>
-              <a:t>5</a:t>
-            </a:r>
-            <a:endParaRPr lang="en-US" kern="0" dirty="0">
-              <a:solidFill>
-                <a:prstClr val="black"/>
-              </a:solidFill>
-              <a:latin typeface="Intel Clear"/>
-            </a:endParaRPr>
+              <a:t>6</a:t>
+            </a:r>
           </a:p>
         </p:txBody>
       </p:sp>
@@ -3520,12 +3519,6 @@
               </a:rPr>
               <a:t>7</a:t>
             </a:r>
-            <a:endParaRPr lang="en-US" kern="0" dirty="0">
-              <a:solidFill>
-                <a:prstClr val="black"/>
-              </a:solidFill>
-              <a:latin typeface="Intel Clear"/>
-            </a:endParaRPr>
           </a:p>
         </p:txBody>
       </p:sp>

</xml_diff>